<commit_message>
updated mod8 slides to fix typos, clarified instructions for activity
</commit_message>
<xml_diff>
--- a/Slides/Module 08 Patterns of React.pptx
+++ b/Slides/Module 08 Patterns of React.pptx
@@ -4100,7 +4100,7 @@
           </a:ln>
           <a:extLst>
             <a:ext uri="{C572A759-6A51-4108-AA02-DFA0A04FC94B}">
-              <ma14:wrappingTextBoxFlag xmlns:ma14="http://schemas.microsoft.com/office/mac/drawingml/2011/main" xmlns:a14="http://schemas.microsoft.com/office/drawing/2010/main" xmlns:m="http://schemas.openxmlformats.org/officeDocument/2006/math" xmlns="" val="1"/>
+              <ma14:wrappingTextBoxFlag xmlns="" xmlns:m="http://schemas.openxmlformats.org/officeDocument/2006/math" xmlns:a14="http://schemas.microsoft.com/office/drawing/2010/main" xmlns:ma14="http://schemas.microsoft.com/office/mac/drawingml/2011/main" val="1"/>
             </a:ext>
           </a:extLst>
         </p:spPr>
@@ -4211,7 +4211,7 @@
           </a:ln>
           <a:extLst>
             <a:ext uri="{C572A759-6A51-4108-AA02-DFA0A04FC94B}">
-              <ma14:wrappingTextBoxFlag xmlns:ma14="http://schemas.microsoft.com/office/mac/drawingml/2011/main" xmlns:a14="http://schemas.microsoft.com/office/drawing/2010/main" xmlns:m="http://schemas.openxmlformats.org/officeDocument/2006/math" xmlns="" val="1"/>
+              <ma14:wrappingTextBoxFlag xmlns="" xmlns:m="http://schemas.openxmlformats.org/officeDocument/2006/math" xmlns:a14="http://schemas.microsoft.com/office/drawing/2010/main" xmlns:ma14="http://schemas.microsoft.com/office/mac/drawingml/2011/main" val="1"/>
             </a:ext>
           </a:extLst>
         </p:spPr>
@@ -5119,7 +5119,7 @@
           </a:prstGeom>
           <a:extLst>
             <a:ext uri="{C572A759-6A51-4108-AA02-DFA0A04FC94B}">
-              <ma14:wrappingTextBoxFlag xmlns:ma14="http://schemas.microsoft.com/office/mac/drawingml/2011/main" xmlns:a14="http://schemas.microsoft.com/office/drawing/2010/main" xmlns:m="http://schemas.openxmlformats.org/officeDocument/2006/math" xmlns="" val="1"/>
+              <ma14:wrappingTextBoxFlag xmlns="" xmlns:m="http://schemas.openxmlformats.org/officeDocument/2006/math" xmlns:a14="http://schemas.microsoft.com/office/drawing/2010/main" xmlns:ma14="http://schemas.microsoft.com/office/mac/drawingml/2011/main" val="1"/>
             </a:ext>
           </a:extLst>
         </p:spPr>
@@ -5154,7 +5154,7 @@
           </a:ln>
           <a:extLst>
             <a:ext uri="{C572A759-6A51-4108-AA02-DFA0A04FC94B}">
-              <ma14:wrappingTextBoxFlag xmlns:ma14="http://schemas.microsoft.com/office/mac/drawingml/2011/main" xmlns:a14="http://schemas.microsoft.com/office/drawing/2010/main" xmlns:m="http://schemas.openxmlformats.org/officeDocument/2006/math" xmlns="" val="1"/>
+              <ma14:wrappingTextBoxFlag xmlns="" xmlns:m="http://schemas.openxmlformats.org/officeDocument/2006/math" xmlns:a14="http://schemas.microsoft.com/office/drawing/2010/main" xmlns:ma14="http://schemas.microsoft.com/office/mac/drawingml/2011/main" val="1"/>
             </a:ext>
           </a:extLst>
         </p:spPr>
@@ -5286,10 +5286,11 @@
               <a:defRPr i="1"/>
             </a:pPr>
             <a:r>
+              <a:rPr dirty="0" err="1"/>
               <a:t>useEffect</a:t>
             </a:r>
             <a:r>
-              <a:rPr i="0"/>
+              <a:rPr i="0" dirty="0"/>
               <a:t> takes an optional array of dependencies</a:t>
             </a:r>
           </a:p>
@@ -5298,7 +5299,7 @@
               <a:defRPr i="1"/>
             </a:pPr>
             <a:r>
-              <a:rPr i="0"/>
+              <a:rPr i="0" dirty="0"/>
               <a:t>The effect is only executed if the values in the dependency array change (by reference equality)</a:t>
             </a:r>
           </a:p>
@@ -5324,7 +5325,7 @@
           </a:prstGeom>
           <a:extLst>
             <a:ext uri="{C572A759-6A51-4108-AA02-DFA0A04FC94B}">
-              <ma14:wrappingTextBoxFlag xmlns:ma14="http://schemas.microsoft.com/office/mac/drawingml/2011/main" xmlns:a14="http://schemas.microsoft.com/office/drawing/2010/main" xmlns:m="http://schemas.openxmlformats.org/officeDocument/2006/math" xmlns="" val="1"/>
+              <ma14:wrappingTextBoxFlag xmlns="" xmlns:m="http://schemas.openxmlformats.org/officeDocument/2006/math" xmlns:a14="http://schemas.microsoft.com/office/drawing/2010/main" xmlns:ma14="http://schemas.microsoft.com/office/mac/drawingml/2011/main" val="1"/>
             </a:ext>
           </a:extLst>
         </p:spPr>
@@ -5358,7 +5359,7 @@
           </a:ln>
           <a:extLst>
             <a:ext uri="{C572A759-6A51-4108-AA02-DFA0A04FC94B}">
-              <ma14:wrappingTextBoxFlag xmlns:ma14="http://schemas.microsoft.com/office/mac/drawingml/2011/main" xmlns:a14="http://schemas.microsoft.com/office/drawing/2010/main" xmlns:m="http://schemas.openxmlformats.org/officeDocument/2006/math" xmlns="" val="1"/>
+              <ma14:wrappingTextBoxFlag xmlns="" xmlns:m="http://schemas.openxmlformats.org/officeDocument/2006/math" xmlns:a14="http://schemas.microsoft.com/office/drawing/2010/main" xmlns:ma14="http://schemas.microsoft.com/office/mac/drawingml/2011/main" val="1"/>
             </a:ext>
           </a:extLst>
         </p:spPr>
@@ -5545,7 +5546,7 @@
             <a:effectLst/>
             <a:extLst>
               <a:ext uri="{C572A759-6A51-4108-AA02-DFA0A04FC94B}">
-                <ma14:wrappingTextBoxFlag xmlns:ma14="http://schemas.microsoft.com/office/mac/drawingml/2011/main" xmlns:a14="http://schemas.microsoft.com/office/drawing/2010/main" xmlns:m="http://schemas.openxmlformats.org/officeDocument/2006/math" xmlns="" val="1"/>
+                <ma14:wrappingTextBoxFlag xmlns="" xmlns:m="http://schemas.openxmlformats.org/officeDocument/2006/math" xmlns:a14="http://schemas.microsoft.com/office/drawing/2010/main" xmlns:ma14="http://schemas.microsoft.com/office/mac/drawingml/2011/main" val="1"/>
               </a:ext>
             </a:extLst>
           </p:spPr>
@@ -5617,7 +5618,7 @@
             <a:effectLst/>
             <a:extLst>
               <a:ext uri="{C572A759-6A51-4108-AA02-DFA0A04FC94B}">
-                <ma14:wrappingTextBoxFlag xmlns:ma14="http://schemas.microsoft.com/office/mac/drawingml/2011/main" xmlns:a14="http://schemas.microsoft.com/office/drawing/2010/main" xmlns:m="http://schemas.openxmlformats.org/officeDocument/2006/math" xmlns="" val="1"/>
+                <ma14:wrappingTextBoxFlag xmlns="" xmlns:m="http://schemas.openxmlformats.org/officeDocument/2006/math" xmlns:a14="http://schemas.microsoft.com/office/drawing/2010/main" xmlns:ma14="http://schemas.microsoft.com/office/mac/drawingml/2011/main" val="1"/>
               </a:ext>
             </a:extLst>
           </p:spPr>
@@ -5839,7 +5840,7 @@
             <a:effectLst/>
             <a:extLst>
               <a:ext uri="{C572A759-6A51-4108-AA02-DFA0A04FC94B}">
-                <ma14:wrappingTextBoxFlag xmlns:ma14="http://schemas.microsoft.com/office/mac/drawingml/2011/main" xmlns:a14="http://schemas.microsoft.com/office/drawing/2010/main" xmlns:m="http://schemas.openxmlformats.org/officeDocument/2006/math" xmlns="" val="1"/>
+                <ma14:wrappingTextBoxFlag xmlns="" xmlns:m="http://schemas.openxmlformats.org/officeDocument/2006/math" xmlns:a14="http://schemas.microsoft.com/office/drawing/2010/main" xmlns:ma14="http://schemas.microsoft.com/office/mac/drawingml/2011/main" val="1"/>
               </a:ext>
             </a:extLst>
           </p:spPr>
@@ -5911,7 +5912,7 @@
             <a:effectLst/>
             <a:extLst>
               <a:ext uri="{C572A759-6A51-4108-AA02-DFA0A04FC94B}">
-                <ma14:wrappingTextBoxFlag xmlns:ma14="http://schemas.microsoft.com/office/mac/drawingml/2011/main" xmlns:a14="http://schemas.microsoft.com/office/drawing/2010/main" xmlns:m="http://schemas.openxmlformats.org/officeDocument/2006/math" xmlns="" val="1"/>
+                <ma14:wrappingTextBoxFlag xmlns="" xmlns:m="http://schemas.openxmlformats.org/officeDocument/2006/math" xmlns:a14="http://schemas.microsoft.com/office/drawing/2010/main" xmlns:ma14="http://schemas.microsoft.com/office/mac/drawingml/2011/main" val="1"/>
               </a:ext>
             </a:extLst>
           </p:spPr>
@@ -6169,7 +6170,7 @@
           </a:prstGeom>
           <a:extLst>
             <a:ext uri="{C572A759-6A51-4108-AA02-DFA0A04FC94B}">
-              <ma14:wrappingTextBoxFlag xmlns:ma14="http://schemas.microsoft.com/office/mac/drawingml/2011/main" xmlns:a14="http://schemas.microsoft.com/office/drawing/2010/main" xmlns:m="http://schemas.openxmlformats.org/officeDocument/2006/math" xmlns="" val="1"/>
+              <ma14:wrappingTextBoxFlag xmlns="" xmlns:m="http://schemas.openxmlformats.org/officeDocument/2006/math" xmlns:a14="http://schemas.microsoft.com/office/drawing/2010/main" xmlns:ma14="http://schemas.microsoft.com/office/mac/drawingml/2011/main" val="1"/>
             </a:ext>
           </a:extLst>
         </p:spPr>
@@ -6209,7 +6210,7 @@
           </a:ln>
           <a:extLst>
             <a:ext uri="{C572A759-6A51-4108-AA02-DFA0A04FC94B}">
-              <ma14:wrappingTextBoxFlag xmlns:ma14="http://schemas.microsoft.com/office/mac/drawingml/2011/main" xmlns:a14="http://schemas.microsoft.com/office/drawing/2010/main" xmlns:m="http://schemas.openxmlformats.org/officeDocument/2006/math" xmlns="" val="1"/>
+              <ma14:wrappingTextBoxFlag xmlns="" xmlns:m="http://schemas.openxmlformats.org/officeDocument/2006/math" xmlns:a14="http://schemas.microsoft.com/office/drawing/2010/main" xmlns:ma14="http://schemas.microsoft.com/office/mac/drawingml/2011/main" val="1"/>
             </a:ext>
           </a:extLst>
         </p:spPr>
@@ -7261,7 +7262,7 @@
           </a:ln>
           <a:extLst>
             <a:ext uri="{C572A759-6A51-4108-AA02-DFA0A04FC94B}">
-              <ma14:wrappingTextBoxFlag xmlns:ma14="http://schemas.microsoft.com/office/mac/drawingml/2011/main" xmlns:a14="http://schemas.microsoft.com/office/drawing/2010/main" xmlns:m="http://schemas.openxmlformats.org/officeDocument/2006/math" xmlns="" val="1"/>
+              <ma14:wrappingTextBoxFlag xmlns="" xmlns:m="http://schemas.openxmlformats.org/officeDocument/2006/math" xmlns:a14="http://schemas.microsoft.com/office/drawing/2010/main" xmlns:ma14="http://schemas.microsoft.com/office/mac/drawingml/2011/main" val="1"/>
             </a:ext>
           </a:extLst>
         </p:spPr>
@@ -7321,7 +7322,7 @@
           </a:ln>
           <a:extLst>
             <a:ext uri="{C572A759-6A51-4108-AA02-DFA0A04FC94B}">
-              <ma14:wrappingTextBoxFlag xmlns:ma14="http://schemas.microsoft.com/office/mac/drawingml/2011/main" xmlns:a14="http://schemas.microsoft.com/office/drawing/2010/main" xmlns:m="http://schemas.openxmlformats.org/officeDocument/2006/math" xmlns="" val="1"/>
+              <ma14:wrappingTextBoxFlag xmlns="" xmlns:m="http://schemas.openxmlformats.org/officeDocument/2006/math" xmlns:a14="http://schemas.microsoft.com/office/drawing/2010/main" xmlns:ma14="http://schemas.microsoft.com/office/mac/drawingml/2011/main" val="1"/>
             </a:ext>
           </a:extLst>
         </p:spPr>
@@ -7545,7 +7546,7 @@
           </a:ln>
           <a:extLst>
             <a:ext uri="{C572A759-6A51-4108-AA02-DFA0A04FC94B}">
-              <ma14:wrappingTextBoxFlag xmlns:ma14="http://schemas.microsoft.com/office/mac/drawingml/2011/main" xmlns:a14="http://schemas.microsoft.com/office/drawing/2010/main" xmlns:m="http://schemas.openxmlformats.org/officeDocument/2006/math" xmlns="" val="1"/>
+              <ma14:wrappingTextBoxFlag xmlns="" xmlns:m="http://schemas.openxmlformats.org/officeDocument/2006/math" xmlns:a14="http://schemas.microsoft.com/office/drawing/2010/main" xmlns:ma14="http://schemas.microsoft.com/office/mac/drawingml/2011/main" val="1"/>
             </a:ext>
           </a:extLst>
         </p:spPr>
@@ -8538,7 +8539,7 @@
           </a:prstGeom>
           <a:extLst>
             <a:ext uri="{C572A759-6A51-4108-AA02-DFA0A04FC94B}">
-              <ma14:wrappingTextBoxFlag xmlns:ma14="http://schemas.microsoft.com/office/mac/drawingml/2011/main" xmlns:a14="http://schemas.microsoft.com/office/drawing/2010/main" xmlns:m="http://schemas.openxmlformats.org/officeDocument/2006/math" xmlns="" val="1"/>
+              <ma14:wrappingTextBoxFlag xmlns="" xmlns:m="http://schemas.openxmlformats.org/officeDocument/2006/math" xmlns:a14="http://schemas.microsoft.com/office/drawing/2010/main" xmlns:ma14="http://schemas.microsoft.com/office/mac/drawingml/2011/main" val="1"/>
             </a:ext>
           </a:extLst>
         </p:spPr>
@@ -8591,7 +8592,7 @@
             <a:effectLst/>
             <a:extLst>
               <a:ext uri="{C572A759-6A51-4108-AA02-DFA0A04FC94B}">
-                <ma14:wrappingTextBoxFlag xmlns:ma14="http://schemas.microsoft.com/office/mac/drawingml/2011/main" xmlns:a14="http://schemas.microsoft.com/office/drawing/2010/main" xmlns:m="http://schemas.openxmlformats.org/officeDocument/2006/math" xmlns="" val="1"/>
+                <ma14:wrappingTextBoxFlag xmlns="" xmlns:m="http://schemas.openxmlformats.org/officeDocument/2006/math" xmlns:a14="http://schemas.microsoft.com/office/drawing/2010/main" xmlns:ma14="http://schemas.microsoft.com/office/mac/drawingml/2011/main" val="1"/>
               </a:ext>
             </a:extLst>
           </p:spPr>
@@ -8684,7 +8685,7 @@
             <a:effectLst/>
             <a:extLst>
               <a:ext uri="{C572A759-6A51-4108-AA02-DFA0A04FC94B}">
-                <ma14:wrappingTextBoxFlag xmlns:ma14="http://schemas.microsoft.com/office/mac/drawingml/2011/main" xmlns:a14="http://schemas.microsoft.com/office/drawing/2010/main" xmlns:m="http://schemas.openxmlformats.org/officeDocument/2006/math" xmlns="" val="1"/>
+                <ma14:wrappingTextBoxFlag xmlns="" xmlns:m="http://schemas.openxmlformats.org/officeDocument/2006/math" xmlns:a14="http://schemas.microsoft.com/office/drawing/2010/main" xmlns:ma14="http://schemas.microsoft.com/office/mac/drawingml/2011/main" val="1"/>
               </a:ext>
             </a:extLst>
           </p:spPr>
@@ -8777,7 +8778,7 @@
             <a:effectLst/>
             <a:extLst>
               <a:ext uri="{C572A759-6A51-4108-AA02-DFA0A04FC94B}">
-                <ma14:wrappingTextBoxFlag xmlns:ma14="http://schemas.microsoft.com/office/mac/drawingml/2011/main" xmlns:a14="http://schemas.microsoft.com/office/drawing/2010/main" xmlns:m="http://schemas.openxmlformats.org/officeDocument/2006/math" xmlns="" val="1"/>
+                <ma14:wrappingTextBoxFlag xmlns="" xmlns:m="http://schemas.openxmlformats.org/officeDocument/2006/math" xmlns:a14="http://schemas.microsoft.com/office/drawing/2010/main" xmlns:ma14="http://schemas.microsoft.com/office/mac/drawingml/2011/main" val="1"/>
               </a:ext>
             </a:extLst>
           </p:spPr>
@@ -9104,7 +9105,15 @@
           <a:p>
             <a:r>
               <a:rPr dirty="0"/>
-              <a:t>Problem: Applications often some data that changes very infrequently, and is needed by many components. Passing that data as properties is cumbersome</a:t>
+              <a:t>Problem: Applications often </a:t>
+            </a:r>
+            <a:r>
+              <a:rPr lang="en-US" dirty="0"/>
+              <a:t>hold </a:t>
+            </a:r>
+            <a:r>
+              <a:rPr dirty="0"/>
+              <a:t>some data that changes very infrequently, and is needed by many components. Passing that data as properties is cumbersome</a:t>
             </a:r>
           </a:p>
           <a:p>
@@ -9151,7 +9160,7 @@
           </a:prstGeom>
           <a:extLst>
             <a:ext uri="{C572A759-6A51-4108-AA02-DFA0A04FC94B}">
-              <ma14:wrappingTextBoxFlag xmlns:ma14="http://schemas.microsoft.com/office/mac/drawingml/2011/main" xmlns:a14="http://schemas.microsoft.com/office/drawing/2010/main" xmlns:m="http://schemas.openxmlformats.org/officeDocument/2006/math" xmlns="" val="1"/>
+              <ma14:wrappingTextBoxFlag xmlns="" xmlns:m="http://schemas.openxmlformats.org/officeDocument/2006/math" xmlns:a14="http://schemas.microsoft.com/office/drawing/2010/main" xmlns:ma14="http://schemas.microsoft.com/office/mac/drawingml/2011/main" val="1"/>
             </a:ext>
           </a:extLst>
         </p:spPr>
@@ -9192,7 +9201,7 @@
           </a:ln>
           <a:extLst>
             <a:ext uri="{C572A759-6A51-4108-AA02-DFA0A04FC94B}">
-              <ma14:wrappingTextBoxFlag xmlns:ma14="http://schemas.microsoft.com/office/mac/drawingml/2011/main" xmlns:a14="http://schemas.microsoft.com/office/drawing/2010/main" xmlns:m="http://schemas.openxmlformats.org/officeDocument/2006/math" xmlns="" val="1"/>
+              <ma14:wrappingTextBoxFlag xmlns="" xmlns:m="http://schemas.openxmlformats.org/officeDocument/2006/math" xmlns:a14="http://schemas.microsoft.com/office/drawing/2010/main" xmlns:ma14="http://schemas.microsoft.com/office/mac/drawingml/2011/main" val="1"/>
             </a:ext>
           </a:extLst>
         </p:spPr>
@@ -9827,7 +9836,7 @@
             <a:effectLst/>
             <a:extLst>
               <a:ext uri="{C572A759-6A51-4108-AA02-DFA0A04FC94B}">
-                <ma14:wrappingTextBoxFlag xmlns:ma14="http://schemas.microsoft.com/office/mac/drawingml/2011/main" xmlns:a14="http://schemas.microsoft.com/office/drawing/2010/main" xmlns:m="http://schemas.openxmlformats.org/officeDocument/2006/math" xmlns="" val="1"/>
+                <ma14:wrappingTextBoxFlag xmlns="" xmlns:m="http://schemas.openxmlformats.org/officeDocument/2006/math" xmlns:a14="http://schemas.microsoft.com/office/drawing/2010/main" xmlns:ma14="http://schemas.microsoft.com/office/mac/drawingml/2011/main" val="1"/>
               </a:ext>
             </a:extLst>
           </p:spPr>
@@ -9923,7 +9932,7 @@
             <a:effectLst/>
             <a:extLst>
               <a:ext uri="{C572A759-6A51-4108-AA02-DFA0A04FC94B}">
-                <ma14:wrappingTextBoxFlag xmlns:ma14="http://schemas.microsoft.com/office/mac/drawingml/2011/main" xmlns:a14="http://schemas.microsoft.com/office/drawing/2010/main" xmlns:m="http://schemas.openxmlformats.org/officeDocument/2006/math" xmlns="" val="1"/>
+                <ma14:wrappingTextBoxFlag xmlns="" xmlns:m="http://schemas.openxmlformats.org/officeDocument/2006/math" xmlns:a14="http://schemas.microsoft.com/office/drawing/2010/main" xmlns:ma14="http://schemas.microsoft.com/office/mac/drawingml/2011/main" val="1"/>
               </a:ext>
             </a:extLst>
           </p:spPr>
@@ -10314,7 +10323,7 @@
           </a:prstGeom>
           <a:extLst>
             <a:ext uri="{C572A759-6A51-4108-AA02-DFA0A04FC94B}">
-              <ma14:wrappingTextBoxFlag xmlns:ma14="http://schemas.microsoft.com/office/mac/drawingml/2011/main" xmlns:a14="http://schemas.microsoft.com/office/drawing/2010/main" xmlns:m="http://schemas.openxmlformats.org/officeDocument/2006/math" xmlns="" val="1"/>
+              <ma14:wrappingTextBoxFlag xmlns="" xmlns:m="http://schemas.openxmlformats.org/officeDocument/2006/math" xmlns:a14="http://schemas.microsoft.com/office/drawing/2010/main" xmlns:ma14="http://schemas.microsoft.com/office/mac/drawingml/2011/main" val="1"/>
             </a:ext>
           </a:extLst>
         </p:spPr>
@@ -10354,7 +10363,7 @@
           </a:ln>
           <a:extLst>
             <a:ext uri="{C572A759-6A51-4108-AA02-DFA0A04FC94B}">
-              <ma14:wrappingTextBoxFlag xmlns:ma14="http://schemas.microsoft.com/office/mac/drawingml/2011/main" xmlns:a14="http://schemas.microsoft.com/office/drawing/2010/main" xmlns:m="http://schemas.openxmlformats.org/officeDocument/2006/math" xmlns="" val="1"/>
+              <ma14:wrappingTextBoxFlag xmlns="" xmlns:m="http://schemas.openxmlformats.org/officeDocument/2006/math" xmlns:a14="http://schemas.microsoft.com/office/drawing/2010/main" xmlns:ma14="http://schemas.microsoft.com/office/mac/drawingml/2011/main" val="1"/>
             </a:ext>
           </a:extLst>
         </p:spPr>
@@ -11131,7 +11140,7 @@
             <a:effectLst/>
             <a:extLst>
               <a:ext uri="{C572A759-6A51-4108-AA02-DFA0A04FC94B}">
-                <ma14:wrappingTextBoxFlag xmlns:ma14="http://schemas.microsoft.com/office/mac/drawingml/2011/main" xmlns:a14="http://schemas.microsoft.com/office/drawing/2010/main" xmlns:m="http://schemas.openxmlformats.org/officeDocument/2006/math" xmlns="" val="1"/>
+                <ma14:wrappingTextBoxFlag xmlns="" xmlns:m="http://schemas.openxmlformats.org/officeDocument/2006/math" xmlns:a14="http://schemas.microsoft.com/office/drawing/2010/main" xmlns:ma14="http://schemas.microsoft.com/office/mac/drawingml/2011/main" val="1"/>
               </a:ext>
             </a:extLst>
           </p:spPr>
@@ -11261,7 +11270,7 @@
             <a:effectLst/>
             <a:extLst>
               <a:ext uri="{C572A759-6A51-4108-AA02-DFA0A04FC94B}">
-                <ma14:wrappingTextBoxFlag xmlns:ma14="http://schemas.microsoft.com/office/mac/drawingml/2011/main" xmlns:a14="http://schemas.microsoft.com/office/drawing/2010/main" xmlns:m="http://schemas.openxmlformats.org/officeDocument/2006/math" xmlns="" val="1"/>
+                <ma14:wrappingTextBoxFlag xmlns="" xmlns:m="http://schemas.openxmlformats.org/officeDocument/2006/math" xmlns:a14="http://schemas.microsoft.com/office/drawing/2010/main" xmlns:ma14="http://schemas.microsoft.com/office/mac/drawingml/2011/main" val="1"/>
               </a:ext>
             </a:extLst>
           </p:spPr>
@@ -11391,7 +11400,7 @@
             <a:effectLst/>
             <a:extLst>
               <a:ext uri="{C572A759-6A51-4108-AA02-DFA0A04FC94B}">
-                <ma14:wrappingTextBoxFlag xmlns:ma14="http://schemas.microsoft.com/office/mac/drawingml/2011/main" xmlns:a14="http://schemas.microsoft.com/office/drawing/2010/main" xmlns:m="http://schemas.openxmlformats.org/officeDocument/2006/math" xmlns="" val="1"/>
+                <ma14:wrappingTextBoxFlag xmlns="" xmlns:m="http://schemas.openxmlformats.org/officeDocument/2006/math" xmlns:a14="http://schemas.microsoft.com/office/drawing/2010/main" xmlns:ma14="http://schemas.microsoft.com/office/mac/drawingml/2011/main" val="1"/>
               </a:ext>
             </a:extLst>
           </p:spPr>
@@ -11697,21 +11706,49 @@
           <a:lstStyle/>
           <a:p>
             <a:r>
-              <a:t>Hooks are APIs provided by React that let components “hook” into React’s internal behavior</a:t>
-            </a:r>
-          </a:p>
-          <a:p>
-            <a:r>
+              <a:rPr dirty="0"/>
+              <a:t>Hooks are APIs provided by React that let components “hook” into </a:t>
+            </a:r>
+            <a:r>
+              <a:rPr dirty="0" err="1"/>
+              <a:t>React’s</a:t>
+            </a:r>
+            <a:r>
+              <a:rPr dirty="0"/>
+              <a:t> internal behavior</a:t>
+            </a:r>
+          </a:p>
+          <a:p>
+            <a:r>
+              <a:rPr dirty="0"/>
               <a:t>Each time that a component is rendered, the hooks will be called again</a:t>
             </a:r>
           </a:p>
           <a:p>
             <a:r>
-              <a:t>React be able to correlate the same calls to the same hook, e.g. to differentiate between two useState calls</a:t>
-            </a:r>
-          </a:p>
-          <a:p>
-            <a:r>
+              <a:rPr dirty="0"/>
+              <a:t>React </a:t>
+            </a:r>
+            <a:r>
+              <a:rPr lang="en-US" dirty="0"/>
+              <a:t>needs to </a:t>
+            </a:r>
+            <a:r>
+              <a:rPr dirty="0"/>
+              <a:t>be able to correlate the same calls to the same hook, e.g. to differentiate between two </a:t>
+            </a:r>
+            <a:r>
+              <a:rPr dirty="0" err="1"/>
+              <a:t>useState</a:t>
+            </a:r>
+            <a:r>
+              <a:rPr dirty="0"/>
+              <a:t> calls</a:t>
+            </a:r>
+          </a:p>
+          <a:p>
+            <a:r>
+              <a:rPr dirty="0"/>
               <a:t>The rules of hooks ensure consistent behavior</a:t>
             </a:r>
           </a:p>
@@ -11737,7 +11774,7 @@
           </a:prstGeom>
           <a:extLst>
             <a:ext uri="{C572A759-6A51-4108-AA02-DFA0A04FC94B}">
-              <ma14:wrappingTextBoxFlag xmlns:ma14="http://schemas.microsoft.com/office/mac/drawingml/2011/main" xmlns:a14="http://schemas.microsoft.com/office/drawing/2010/main" xmlns:m="http://schemas.openxmlformats.org/officeDocument/2006/math" xmlns="" val="1"/>
+              <ma14:wrappingTextBoxFlag xmlns="" xmlns:m="http://schemas.openxmlformats.org/officeDocument/2006/math" xmlns:a14="http://schemas.microsoft.com/office/drawing/2010/main" xmlns:ma14="http://schemas.microsoft.com/office/mac/drawingml/2011/main" val="1"/>
             </a:ext>
           </a:extLst>
         </p:spPr>
@@ -11746,6 +11783,7 @@
           <a:lstStyle/>
           <a:p>
             <a:fld id="{86CB4B4D-7CA3-9044-876B-883B54F8677D}" type="slidenum">
+              <a:rPr/>
               <a:t>15</a:t>
             </a:fld>
             <a:endParaRPr/>
@@ -11777,7 +11815,7 @@
           </a:ln>
           <a:extLst>
             <a:ext uri="{C572A759-6A51-4108-AA02-DFA0A04FC94B}">
-              <ma14:wrappingTextBoxFlag xmlns:ma14="http://schemas.microsoft.com/office/mac/drawingml/2011/main" xmlns:a14="http://schemas.microsoft.com/office/drawing/2010/main" xmlns:m="http://schemas.openxmlformats.org/officeDocument/2006/math" xmlns="" val="1"/>
+              <ma14:wrappingTextBoxFlag xmlns="" xmlns:m="http://schemas.openxmlformats.org/officeDocument/2006/math" xmlns:a14="http://schemas.microsoft.com/office/drawing/2010/main" xmlns:ma14="http://schemas.microsoft.com/office/mac/drawingml/2011/main" val="1"/>
             </a:ext>
           </a:extLst>
         </p:spPr>
@@ -12052,7 +12090,7 @@
             <a:effectLst/>
             <a:extLst>
               <a:ext uri="{C572A759-6A51-4108-AA02-DFA0A04FC94B}">
-                <ma14:wrappingTextBoxFlag xmlns:ma14="http://schemas.microsoft.com/office/mac/drawingml/2011/main" xmlns:a14="http://schemas.microsoft.com/office/drawing/2010/main" xmlns:m="http://schemas.openxmlformats.org/officeDocument/2006/math" xmlns="" val="1"/>
+                <ma14:wrappingTextBoxFlag xmlns="" xmlns:m="http://schemas.openxmlformats.org/officeDocument/2006/math" xmlns:a14="http://schemas.microsoft.com/office/drawing/2010/main" xmlns:ma14="http://schemas.microsoft.com/office/mac/drawingml/2011/main" val="1"/>
               </a:ext>
             </a:extLst>
           </p:spPr>
@@ -12305,7 +12343,7 @@
           </a:prstGeom>
           <a:extLst>
             <a:ext uri="{C572A759-6A51-4108-AA02-DFA0A04FC94B}">
-              <ma14:wrappingTextBoxFlag xmlns:ma14="http://schemas.microsoft.com/office/mac/drawingml/2011/main" xmlns:a14="http://schemas.microsoft.com/office/drawing/2010/main" xmlns:m="http://schemas.openxmlformats.org/officeDocument/2006/math" xmlns="" val="1"/>
+              <ma14:wrappingTextBoxFlag xmlns="" xmlns:m="http://schemas.openxmlformats.org/officeDocument/2006/math" xmlns:a14="http://schemas.microsoft.com/office/drawing/2010/main" xmlns:ma14="http://schemas.microsoft.com/office/mac/drawingml/2011/main" val="1"/>
             </a:ext>
           </a:extLst>
         </p:spPr>
@@ -12345,7 +12383,7 @@
           </a:ln>
           <a:extLst>
             <a:ext uri="{C572A759-6A51-4108-AA02-DFA0A04FC94B}">
-              <ma14:wrappingTextBoxFlag xmlns:ma14="http://schemas.microsoft.com/office/mac/drawingml/2011/main" xmlns:a14="http://schemas.microsoft.com/office/drawing/2010/main" xmlns:m="http://schemas.openxmlformats.org/officeDocument/2006/math" xmlns="" val="1"/>
+              <ma14:wrappingTextBoxFlag xmlns="" xmlns:m="http://schemas.openxmlformats.org/officeDocument/2006/math" xmlns:a14="http://schemas.microsoft.com/office/drawing/2010/main" xmlns:ma14="http://schemas.microsoft.com/office/mac/drawingml/2011/main" val="1"/>
             </a:ext>
           </a:extLst>
         </p:spPr>
@@ -12620,7 +12658,7 @@
             <a:effectLst/>
             <a:extLst>
               <a:ext uri="{C572A759-6A51-4108-AA02-DFA0A04FC94B}">
-                <ma14:wrappingTextBoxFlag xmlns:ma14="http://schemas.microsoft.com/office/mac/drawingml/2011/main" xmlns:a14="http://schemas.microsoft.com/office/drawing/2010/main" xmlns:m="http://schemas.openxmlformats.org/officeDocument/2006/math" xmlns="" val="1"/>
+                <ma14:wrappingTextBoxFlag xmlns="" xmlns:m="http://schemas.openxmlformats.org/officeDocument/2006/math" xmlns:a14="http://schemas.microsoft.com/office/drawing/2010/main" xmlns:ma14="http://schemas.microsoft.com/office/mac/drawingml/2011/main" val="1"/>
               </a:ext>
             </a:extLst>
           </p:spPr>
@@ -12834,7 +12872,7 @@
           </a:prstGeom>
           <a:extLst>
             <a:ext uri="{C572A759-6A51-4108-AA02-DFA0A04FC94B}">
-              <ma14:wrappingTextBoxFlag xmlns:ma14="http://schemas.microsoft.com/office/mac/drawingml/2011/main" xmlns:a14="http://schemas.microsoft.com/office/drawing/2010/main" xmlns:m="http://schemas.openxmlformats.org/officeDocument/2006/math" xmlns="" val="1"/>
+              <ma14:wrappingTextBoxFlag xmlns="" xmlns:m="http://schemas.openxmlformats.org/officeDocument/2006/math" xmlns:a14="http://schemas.microsoft.com/office/drawing/2010/main" xmlns:ma14="http://schemas.microsoft.com/office/mac/drawingml/2011/main" val="1"/>
             </a:ext>
           </a:extLst>
         </p:spPr>
@@ -12958,7 +12996,7 @@
           </a:prstGeom>
           <a:extLst>
             <a:ext uri="{C572A759-6A51-4108-AA02-DFA0A04FC94B}">
-              <ma14:wrappingTextBoxFlag xmlns:ma14="http://schemas.microsoft.com/office/mac/drawingml/2011/main" xmlns:a14="http://schemas.microsoft.com/office/drawing/2010/main" xmlns:m="http://schemas.openxmlformats.org/officeDocument/2006/math" xmlns="" val="1"/>
+              <ma14:wrappingTextBoxFlag xmlns="" xmlns:m="http://schemas.openxmlformats.org/officeDocument/2006/math" xmlns:a14="http://schemas.microsoft.com/office/drawing/2010/main" xmlns:ma14="http://schemas.microsoft.com/office/mac/drawingml/2011/main" val="1"/>
             </a:ext>
           </a:extLst>
         </p:spPr>
@@ -12998,7 +13036,7 @@
           </a:ln>
           <a:extLst>
             <a:ext uri="{C572A759-6A51-4108-AA02-DFA0A04FC94B}">
-              <ma14:wrappingTextBoxFlag xmlns:ma14="http://schemas.microsoft.com/office/mac/drawingml/2011/main" xmlns:a14="http://schemas.microsoft.com/office/drawing/2010/main" xmlns:m="http://schemas.openxmlformats.org/officeDocument/2006/math" xmlns="" val="1"/>
+              <ma14:wrappingTextBoxFlag xmlns="" xmlns:m="http://schemas.openxmlformats.org/officeDocument/2006/math" xmlns:a14="http://schemas.microsoft.com/office/drawing/2010/main" xmlns:ma14="http://schemas.microsoft.com/office/mac/drawingml/2011/main" val="1"/>
             </a:ext>
           </a:extLst>
         </p:spPr>
@@ -13693,7 +13731,7 @@
           </a:prstGeom>
           <a:extLst>
             <a:ext uri="{C572A759-6A51-4108-AA02-DFA0A04FC94B}">
-              <ma14:wrappingTextBoxFlag xmlns:ma14="http://schemas.microsoft.com/office/mac/drawingml/2011/main" xmlns:a14="http://schemas.microsoft.com/office/drawing/2010/main" xmlns:m="http://schemas.openxmlformats.org/officeDocument/2006/math" xmlns="" val="1"/>
+              <ma14:wrappingTextBoxFlag xmlns="" xmlns:m="http://schemas.openxmlformats.org/officeDocument/2006/math" xmlns:a14="http://schemas.microsoft.com/office/drawing/2010/main" xmlns:ma14="http://schemas.microsoft.com/office/mac/drawingml/2011/main" val="1"/>
             </a:ext>
           </a:extLst>
         </p:spPr>
@@ -13727,7 +13765,7 @@
           </a:ln>
           <a:extLst>
             <a:ext uri="{C572A759-6A51-4108-AA02-DFA0A04FC94B}">
-              <ma14:wrappingTextBoxFlag xmlns:ma14="http://schemas.microsoft.com/office/mac/drawingml/2011/main" xmlns:a14="http://schemas.microsoft.com/office/drawing/2010/main" xmlns:m="http://schemas.openxmlformats.org/officeDocument/2006/math" xmlns="" val="1"/>
+              <ma14:wrappingTextBoxFlag xmlns="" xmlns:m="http://schemas.openxmlformats.org/officeDocument/2006/math" xmlns:a14="http://schemas.microsoft.com/office/drawing/2010/main" xmlns:ma14="http://schemas.microsoft.com/office/mac/drawingml/2011/main" val="1"/>
             </a:ext>
           </a:extLst>
         </p:spPr>
@@ -13986,7 +14024,7 @@
           </a:prstGeom>
           <a:extLst>
             <a:ext uri="{C572A759-6A51-4108-AA02-DFA0A04FC94B}">
-              <ma14:wrappingTextBoxFlag xmlns:ma14="http://schemas.microsoft.com/office/mac/drawingml/2011/main" xmlns:a14="http://schemas.microsoft.com/office/drawing/2010/main" xmlns:m="http://schemas.openxmlformats.org/officeDocument/2006/math" xmlns="" val="1"/>
+              <ma14:wrappingTextBoxFlag xmlns="" xmlns:m="http://schemas.openxmlformats.org/officeDocument/2006/math" xmlns:a14="http://schemas.microsoft.com/office/drawing/2010/main" xmlns:ma14="http://schemas.microsoft.com/office/mac/drawingml/2011/main" val="1"/>
             </a:ext>
           </a:extLst>
         </p:spPr>
@@ -14128,7 +14166,7 @@
           </a:prstGeom>
           <a:extLst>
             <a:ext uri="{C572A759-6A51-4108-AA02-DFA0A04FC94B}">
-              <ma14:wrappingTextBoxFlag xmlns:ma14="http://schemas.microsoft.com/office/mac/drawingml/2011/main" xmlns:a14="http://schemas.microsoft.com/office/drawing/2010/main" xmlns:m="http://schemas.openxmlformats.org/officeDocument/2006/math" xmlns="" val="1"/>
+              <ma14:wrappingTextBoxFlag xmlns="" xmlns:m="http://schemas.openxmlformats.org/officeDocument/2006/math" xmlns:a14="http://schemas.microsoft.com/office/drawing/2010/main" xmlns:ma14="http://schemas.microsoft.com/office/mac/drawingml/2011/main" val="1"/>
             </a:ext>
           </a:extLst>
         </p:spPr>
@@ -14265,7 +14303,7 @@
           </a:prstGeom>
           <a:extLst>
             <a:ext uri="{C572A759-6A51-4108-AA02-DFA0A04FC94B}">
-              <ma14:wrappingTextBoxFlag xmlns:ma14="http://schemas.microsoft.com/office/mac/drawingml/2011/main" xmlns:a14="http://schemas.microsoft.com/office/drawing/2010/main" xmlns:m="http://schemas.openxmlformats.org/officeDocument/2006/math" xmlns="" val="1"/>
+              <ma14:wrappingTextBoxFlag xmlns="" xmlns:m="http://schemas.openxmlformats.org/officeDocument/2006/math" xmlns:a14="http://schemas.microsoft.com/office/drawing/2010/main" xmlns:ma14="http://schemas.microsoft.com/office/mac/drawingml/2011/main" val="1"/>
             </a:ext>
           </a:extLst>
         </p:spPr>
@@ -14472,7 +14510,7 @@
           </a:prstGeom>
           <a:extLst>
             <a:ext uri="{C572A759-6A51-4108-AA02-DFA0A04FC94B}">
-              <ma14:wrappingTextBoxFlag xmlns:ma14="http://schemas.microsoft.com/office/mac/drawingml/2011/main" xmlns:a14="http://schemas.microsoft.com/office/drawing/2010/main" xmlns:m="http://schemas.openxmlformats.org/officeDocument/2006/math" xmlns="" val="1"/>
+              <ma14:wrappingTextBoxFlag xmlns="" xmlns:m="http://schemas.openxmlformats.org/officeDocument/2006/math" xmlns:a14="http://schemas.microsoft.com/office/drawing/2010/main" xmlns:ma14="http://schemas.microsoft.com/office/mac/drawingml/2011/main" val="1"/>
             </a:ext>
           </a:extLst>
         </p:spPr>
@@ -14611,7 +14649,7 @@
           </a:prstGeom>
           <a:extLst>
             <a:ext uri="{C572A759-6A51-4108-AA02-DFA0A04FC94B}">
-              <ma14:wrappingTextBoxFlag xmlns:ma14="http://schemas.microsoft.com/office/mac/drawingml/2011/main" xmlns:a14="http://schemas.microsoft.com/office/drawing/2010/main" xmlns:m="http://schemas.openxmlformats.org/officeDocument/2006/math" xmlns="" val="1"/>
+              <ma14:wrappingTextBoxFlag xmlns="" xmlns:m="http://schemas.openxmlformats.org/officeDocument/2006/math" xmlns:a14="http://schemas.microsoft.com/office/drawing/2010/main" xmlns:ma14="http://schemas.microsoft.com/office/mac/drawingml/2011/main" val="1"/>
             </a:ext>
           </a:extLst>
         </p:spPr>
@@ -14712,7 +14750,7 @@
             </a:pPr>
             <a:r>
               <a:rPr lang="en-US" dirty="0"/>
-              <a:t>To solve common problems we will discuss the following:</a:t>
+              <a:t>To solve common problems, we will discuss the following:</a:t>
             </a:r>
           </a:p>
           <a:p>
@@ -14767,7 +14805,7 @@
           </a:prstGeom>
           <a:extLst>
             <a:ext uri="{C572A759-6A51-4108-AA02-DFA0A04FC94B}">
-              <ma14:wrappingTextBoxFlag xmlns:ma14="http://schemas.microsoft.com/office/mac/drawingml/2011/main" xmlns:a14="http://schemas.microsoft.com/office/drawing/2010/main" xmlns:m="http://schemas.openxmlformats.org/officeDocument/2006/math" xmlns="" val="1"/>
+              <ma14:wrappingTextBoxFlag xmlns="" xmlns:m="http://schemas.openxmlformats.org/officeDocument/2006/math" xmlns:a14="http://schemas.microsoft.com/office/drawing/2010/main" xmlns:ma14="http://schemas.microsoft.com/office/mac/drawingml/2011/main" val="1"/>
             </a:ext>
           </a:extLst>
         </p:spPr>
@@ -14868,7 +14906,7 @@
           </a:prstGeom>
           <a:extLst>
             <a:ext uri="{C572A759-6A51-4108-AA02-DFA0A04FC94B}">
-              <ma14:wrappingTextBoxFlag xmlns:ma14="http://schemas.microsoft.com/office/mac/drawingml/2011/main" xmlns:a14="http://schemas.microsoft.com/office/drawing/2010/main" xmlns:m="http://schemas.openxmlformats.org/officeDocument/2006/math" xmlns="" val="1"/>
+              <ma14:wrappingTextBoxFlag xmlns="" xmlns:m="http://schemas.openxmlformats.org/officeDocument/2006/math" xmlns:a14="http://schemas.microsoft.com/office/drawing/2010/main" xmlns:ma14="http://schemas.microsoft.com/office/mac/drawingml/2011/main" val="1"/>
             </a:ext>
           </a:extLst>
         </p:spPr>
@@ -14909,7 +14947,7 @@
           </a:ln>
           <a:extLst>
             <a:ext uri="{C572A759-6A51-4108-AA02-DFA0A04FC94B}">
-              <ma14:wrappingTextBoxFlag xmlns:ma14="http://schemas.microsoft.com/office/mac/drawingml/2011/main" xmlns:a14="http://schemas.microsoft.com/office/drawing/2010/main" xmlns:m="http://schemas.openxmlformats.org/officeDocument/2006/math" xmlns="" val="1"/>
+              <ma14:wrappingTextBoxFlag xmlns="" xmlns:m="http://schemas.openxmlformats.org/officeDocument/2006/math" xmlns:a14="http://schemas.microsoft.com/office/drawing/2010/main" xmlns:ma14="http://schemas.microsoft.com/office/mac/drawingml/2011/main" val="1"/>
             </a:ext>
           </a:extLst>
         </p:spPr>
@@ -15497,7 +15535,7 @@
           </a:ln>
           <a:extLst>
             <a:ext uri="{C572A759-6A51-4108-AA02-DFA0A04FC94B}">
-              <ma14:wrappingTextBoxFlag xmlns:ma14="http://schemas.microsoft.com/office/mac/drawingml/2011/main" xmlns:a14="http://schemas.microsoft.com/office/drawing/2010/main" xmlns:m="http://schemas.openxmlformats.org/officeDocument/2006/math" xmlns="" val="1"/>
+              <ma14:wrappingTextBoxFlag xmlns="" xmlns:m="http://schemas.openxmlformats.org/officeDocument/2006/math" xmlns:a14="http://schemas.microsoft.com/office/drawing/2010/main" xmlns:ma14="http://schemas.microsoft.com/office/mac/drawingml/2011/main" val="1"/>
             </a:ext>
           </a:extLst>
         </p:spPr>
@@ -15551,7 +15589,7 @@
           </a:ln>
           <a:extLst>
             <a:ext uri="{C572A759-6A51-4108-AA02-DFA0A04FC94B}">
-              <ma14:wrappingTextBoxFlag xmlns:ma14="http://schemas.microsoft.com/office/mac/drawingml/2011/main" xmlns:a14="http://schemas.microsoft.com/office/drawing/2010/main" xmlns:m="http://schemas.openxmlformats.org/officeDocument/2006/math" xmlns="" val="1"/>
+              <ma14:wrappingTextBoxFlag xmlns="" xmlns:m="http://schemas.openxmlformats.org/officeDocument/2006/math" xmlns:a14="http://schemas.microsoft.com/office/drawing/2010/main" xmlns:ma14="http://schemas.microsoft.com/office/mac/drawingml/2011/main" val="1"/>
             </a:ext>
           </a:extLst>
         </p:spPr>
@@ -15591,7 +15629,7 @@
           </a:ln>
           <a:extLst>
             <a:ext uri="{C572A759-6A51-4108-AA02-DFA0A04FC94B}">
-              <ma14:wrappingTextBoxFlag xmlns:ma14="http://schemas.microsoft.com/office/mac/drawingml/2011/main" xmlns:a14="http://schemas.microsoft.com/office/drawing/2010/main" xmlns:m="http://schemas.openxmlformats.org/officeDocument/2006/math" xmlns="" val="1"/>
+              <ma14:wrappingTextBoxFlag xmlns="" xmlns:m="http://schemas.openxmlformats.org/officeDocument/2006/math" xmlns:a14="http://schemas.microsoft.com/office/drawing/2010/main" xmlns:ma14="http://schemas.microsoft.com/office/mac/drawingml/2011/main" val="1"/>
             </a:ext>
           </a:extLst>
         </p:spPr>
@@ -15635,7 +15673,7 @@
           </a:ln>
           <a:extLst>
             <a:ext uri="{C572A759-6A51-4108-AA02-DFA0A04FC94B}">
-              <ma14:wrappingTextBoxFlag xmlns:ma14="http://schemas.microsoft.com/office/mac/drawingml/2011/main" xmlns:a14="http://schemas.microsoft.com/office/drawing/2010/main" xmlns:m="http://schemas.openxmlformats.org/officeDocument/2006/math" xmlns="" val="1"/>
+              <ma14:wrappingTextBoxFlag xmlns="" xmlns:m="http://schemas.openxmlformats.org/officeDocument/2006/math" xmlns:a14="http://schemas.microsoft.com/office/drawing/2010/main" xmlns:ma14="http://schemas.microsoft.com/office/mac/drawingml/2011/main" val="1"/>
             </a:ext>
           </a:extLst>
         </p:spPr>
@@ -15836,7 +15874,7 @@
           <a:effectLst/>
           <a:extLst>
             <a:ext uri="{C572A759-6A51-4108-AA02-DFA0A04FC94B}">
-              <ma14:wrappingTextBoxFlag xmlns:ma14="http://schemas.microsoft.com/office/mac/drawingml/2011/main" xmlns:a14="http://schemas.microsoft.com/office/drawing/2010/main" xmlns:m="http://schemas.openxmlformats.org/officeDocument/2006/math" xmlns="" val="1"/>
+              <ma14:wrappingTextBoxFlag xmlns="" xmlns:m="http://schemas.openxmlformats.org/officeDocument/2006/math" xmlns:a14="http://schemas.microsoft.com/office/drawing/2010/main" xmlns:ma14="http://schemas.microsoft.com/office/mac/drawingml/2011/main" val="1"/>
             </a:ext>
           </a:extLst>
         </p:spPr>
@@ -15889,7 +15927,7 @@
           <a:effectLst/>
           <a:extLst>
             <a:ext uri="{C572A759-6A51-4108-AA02-DFA0A04FC94B}">
-              <ma14:wrappingTextBoxFlag xmlns:ma14="http://schemas.microsoft.com/office/mac/drawingml/2011/main" xmlns:a14="http://schemas.microsoft.com/office/drawing/2010/main" xmlns:m="http://schemas.openxmlformats.org/officeDocument/2006/math" xmlns="" val="1"/>
+              <ma14:wrappingTextBoxFlag xmlns="" xmlns:m="http://schemas.openxmlformats.org/officeDocument/2006/math" xmlns:a14="http://schemas.microsoft.com/office/drawing/2010/main" xmlns:ma14="http://schemas.microsoft.com/office/mac/drawingml/2011/main" val="1"/>
             </a:ext>
           </a:extLst>
         </p:spPr>
@@ -16191,7 +16229,7 @@
           </a:prstGeom>
           <a:extLst>
             <a:ext uri="{C572A759-6A51-4108-AA02-DFA0A04FC94B}">
-              <ma14:wrappingTextBoxFlag xmlns:ma14="http://schemas.microsoft.com/office/mac/drawingml/2011/main" xmlns:a14="http://schemas.microsoft.com/office/drawing/2010/main" xmlns:m="http://schemas.openxmlformats.org/officeDocument/2006/math" xmlns="" val="1"/>
+              <ma14:wrappingTextBoxFlag xmlns="" xmlns:m="http://schemas.openxmlformats.org/officeDocument/2006/math" xmlns:a14="http://schemas.microsoft.com/office/drawing/2010/main" xmlns:ma14="http://schemas.microsoft.com/office/mac/drawingml/2011/main" val="1"/>
             </a:ext>
           </a:extLst>
         </p:spPr>
@@ -16232,7 +16270,7 @@
           </a:ln>
           <a:extLst>
             <a:ext uri="{C572A759-6A51-4108-AA02-DFA0A04FC94B}">
-              <ma14:wrappingTextBoxFlag xmlns:ma14="http://schemas.microsoft.com/office/mac/drawingml/2011/main" xmlns:a14="http://schemas.microsoft.com/office/drawing/2010/main" xmlns:m="http://schemas.openxmlformats.org/officeDocument/2006/math" xmlns="" val="1"/>
+              <ma14:wrappingTextBoxFlag xmlns="" xmlns:m="http://schemas.openxmlformats.org/officeDocument/2006/math" xmlns:a14="http://schemas.microsoft.com/office/drawing/2010/main" xmlns:ma14="http://schemas.microsoft.com/office/mac/drawingml/2011/main" val="1"/>
             </a:ext>
           </a:extLst>
         </p:spPr>
@@ -17008,7 +17046,7 @@
             </a:r>
             <a:r>
               <a:rPr lang="en-US" dirty="0"/>
-              <a:t>re-render our component and the state variables is updated</a:t>
+              <a:t>re-render our component and the state variable is updated</a:t>
             </a:r>
           </a:p>
           <a:p>
@@ -17051,7 +17089,7 @@
           </a:prstGeom>
           <a:extLst>
             <a:ext uri="{C572A759-6A51-4108-AA02-DFA0A04FC94B}">
-              <ma14:wrappingTextBoxFlag xmlns:ma14="http://schemas.microsoft.com/office/mac/drawingml/2011/main" xmlns:a14="http://schemas.microsoft.com/office/drawing/2010/main" xmlns:m="http://schemas.openxmlformats.org/officeDocument/2006/math" xmlns="" val="1"/>
+              <ma14:wrappingTextBoxFlag xmlns="" xmlns:m="http://schemas.openxmlformats.org/officeDocument/2006/math" xmlns:a14="http://schemas.microsoft.com/office/drawing/2010/main" xmlns:ma14="http://schemas.microsoft.com/office/mac/drawingml/2011/main" val="1"/>
             </a:ext>
           </a:extLst>
         </p:spPr>
@@ -17092,7 +17130,7 @@
           </a:ln>
           <a:extLst>
             <a:ext uri="{C572A759-6A51-4108-AA02-DFA0A04FC94B}">
-              <ma14:wrappingTextBoxFlag xmlns:ma14="http://schemas.microsoft.com/office/mac/drawingml/2011/main" xmlns:a14="http://schemas.microsoft.com/office/drawing/2010/main" xmlns:m="http://schemas.openxmlformats.org/officeDocument/2006/math" xmlns="" val="1"/>
+              <ma14:wrappingTextBoxFlag xmlns="" xmlns:m="http://schemas.openxmlformats.org/officeDocument/2006/math" xmlns:a14="http://schemas.microsoft.com/office/drawing/2010/main" xmlns:ma14="http://schemas.microsoft.com/office/mac/drawingml/2011/main" val="1"/>
             </a:ext>
           </a:extLst>
         </p:spPr>
@@ -17853,7 +17891,7 @@
           </a:ln>
           <a:extLst>
             <a:ext uri="{C572A759-6A51-4108-AA02-DFA0A04FC94B}">
-              <ma14:wrappingTextBoxFlag xmlns:ma14="http://schemas.microsoft.com/office/mac/drawingml/2011/main" xmlns:a14="http://schemas.microsoft.com/office/drawing/2010/main" xmlns:m="http://schemas.openxmlformats.org/officeDocument/2006/math" xmlns="" val="1"/>
+              <ma14:wrappingTextBoxFlag xmlns="" xmlns:m="http://schemas.openxmlformats.org/officeDocument/2006/math" xmlns:a14="http://schemas.microsoft.com/office/drawing/2010/main" xmlns:ma14="http://schemas.microsoft.com/office/mac/drawingml/2011/main" val="1"/>
             </a:ext>
           </a:extLst>
         </p:spPr>
@@ -18081,7 +18119,15 @@
           <a:p>
             <a:r>
               <a:rPr dirty="0"/>
-              <a:t>Problem: How to define side-effects that run in response to data changing (and in turn, the component re-rendering)?</a:t>
+              <a:t>Problem: How to define side-effects that run in response to </a:t>
+            </a:r>
+            <a:r>
+              <a:rPr lang="en-US" dirty="0"/>
+              <a:t>the </a:t>
+            </a:r>
+            <a:r>
+              <a:rPr dirty="0"/>
+              <a:t>data changing (and in turn, the component re-rendering)?</a:t>
             </a:r>
             <a:r>
               <a:rPr lang="en-US" dirty="0"/>
@@ -18140,7 +18186,7 @@
           </a:prstGeom>
           <a:extLst>
             <a:ext uri="{C572A759-6A51-4108-AA02-DFA0A04FC94B}">
-              <ma14:wrappingTextBoxFlag xmlns:ma14="http://schemas.microsoft.com/office/mac/drawingml/2011/main" xmlns:a14="http://schemas.microsoft.com/office/drawing/2010/main" xmlns:m="http://schemas.openxmlformats.org/officeDocument/2006/math" xmlns="" val="1"/>
+              <ma14:wrappingTextBoxFlag xmlns="" xmlns:m="http://schemas.openxmlformats.org/officeDocument/2006/math" xmlns:a14="http://schemas.microsoft.com/office/drawing/2010/main" xmlns:ma14="http://schemas.microsoft.com/office/mac/drawingml/2011/main" val="1"/>
             </a:ext>
           </a:extLst>
         </p:spPr>
@@ -18175,7 +18221,7 @@
           </a:ln>
           <a:extLst>
             <a:ext uri="{C572A759-6A51-4108-AA02-DFA0A04FC94B}">
-              <ma14:wrappingTextBoxFlag xmlns:ma14="http://schemas.microsoft.com/office/mac/drawingml/2011/main" xmlns:a14="http://schemas.microsoft.com/office/drawing/2010/main" xmlns:m="http://schemas.openxmlformats.org/officeDocument/2006/math" xmlns="" val="1"/>
+              <ma14:wrappingTextBoxFlag xmlns="" xmlns:m="http://schemas.openxmlformats.org/officeDocument/2006/math" xmlns:a14="http://schemas.microsoft.com/office/drawing/2010/main" xmlns:ma14="http://schemas.microsoft.com/office/mac/drawingml/2011/main" val="1"/>
             </a:ext>
           </a:extLst>
         </p:spPr>
@@ -18424,27 +18470,35 @@
           <a:lstStyle/>
           <a:p>
             <a:r>
-              <a:t>React’s </a:t>
-            </a:r>
-            <a:r>
-              <a:rPr i="1"/>
+              <a:rPr dirty="0" err="1"/>
+              <a:t>React’s</a:t>
+            </a:r>
+            <a:r>
+              <a:rPr dirty="0"/>
+              <a:t> </a:t>
+            </a:r>
+            <a:r>
+              <a:rPr i="1" dirty="0" err="1"/>
               <a:t>useEffect</a:t>
             </a:r>
             <a:r>
+              <a:rPr dirty="0"/>
               <a:t> hook accepts a function that is </a:t>
             </a:r>
             <a:r>
-              <a:rPr i="1"/>
+              <a:rPr i="1" dirty="0"/>
               <a:t>always</a:t>
             </a:r>
             <a:r>
+              <a:rPr dirty="0"/>
               <a:t> called </a:t>
             </a:r>
             <a:r>
-              <a:rPr i="1"/>
+              <a:rPr i="1" dirty="0"/>
               <a:t>after</a:t>
             </a:r>
             <a:r>
+              <a:rPr dirty="0"/>
               <a:t> the component is updated</a:t>
             </a:r>
           </a:p>
@@ -18470,7 +18524,7 @@
           </a:prstGeom>
           <a:extLst>
             <a:ext uri="{C572A759-6A51-4108-AA02-DFA0A04FC94B}">
-              <ma14:wrappingTextBoxFlag xmlns:ma14="http://schemas.microsoft.com/office/mac/drawingml/2011/main" xmlns:a14="http://schemas.microsoft.com/office/drawing/2010/main" xmlns:m="http://schemas.openxmlformats.org/officeDocument/2006/math" xmlns="" val="1"/>
+              <ma14:wrappingTextBoxFlag xmlns="" xmlns:m="http://schemas.openxmlformats.org/officeDocument/2006/math" xmlns:a14="http://schemas.microsoft.com/office/drawing/2010/main" xmlns:ma14="http://schemas.microsoft.com/office/mac/drawingml/2011/main" val="1"/>
             </a:ext>
           </a:extLst>
         </p:spPr>
@@ -18510,7 +18564,7 @@
           </a:ln>
           <a:extLst>
             <a:ext uri="{C572A759-6A51-4108-AA02-DFA0A04FC94B}">
-              <ma14:wrappingTextBoxFlag xmlns:ma14="http://schemas.microsoft.com/office/mac/drawingml/2011/main" xmlns:a14="http://schemas.microsoft.com/office/drawing/2010/main" xmlns:m="http://schemas.openxmlformats.org/officeDocument/2006/math" xmlns="" val="1"/>
+              <ma14:wrappingTextBoxFlag xmlns="" xmlns:m="http://schemas.openxmlformats.org/officeDocument/2006/math" xmlns:a14="http://schemas.microsoft.com/office/drawing/2010/main" xmlns:ma14="http://schemas.microsoft.com/office/mac/drawingml/2011/main" val="1"/>
             </a:ext>
           </a:extLst>
         </p:spPr>
@@ -19551,7 +19605,7 @@
           </a:ln>
           <a:extLst>
             <a:ext uri="{C572A759-6A51-4108-AA02-DFA0A04FC94B}">
-              <ma14:wrappingTextBoxFlag xmlns:ma14="http://schemas.microsoft.com/office/mac/drawingml/2011/main" xmlns:a14="http://schemas.microsoft.com/office/drawing/2010/main" xmlns:m="http://schemas.openxmlformats.org/officeDocument/2006/math" xmlns="" val="1"/>
+              <ma14:wrappingTextBoxFlag xmlns="" xmlns:m="http://schemas.openxmlformats.org/officeDocument/2006/math" xmlns:a14="http://schemas.microsoft.com/office/drawing/2010/main" xmlns:ma14="http://schemas.microsoft.com/office/mac/drawingml/2011/main" val="1"/>
             </a:ext>
           </a:extLst>
         </p:spPr>
@@ -19611,7 +19665,7 @@
           </a:ln>
           <a:extLst>
             <a:ext uri="{C572A759-6A51-4108-AA02-DFA0A04FC94B}">
-              <ma14:wrappingTextBoxFlag xmlns:ma14="http://schemas.microsoft.com/office/mac/drawingml/2011/main" xmlns:a14="http://schemas.microsoft.com/office/drawing/2010/main" xmlns:m="http://schemas.openxmlformats.org/officeDocument/2006/math" xmlns="" val="1"/>
+              <ma14:wrappingTextBoxFlag xmlns="" xmlns:m="http://schemas.openxmlformats.org/officeDocument/2006/math" xmlns:a14="http://schemas.microsoft.com/office/drawing/2010/main" xmlns:ma14="http://schemas.microsoft.com/office/mac/drawingml/2011/main" val="1"/>
             </a:ext>
           </a:extLst>
         </p:spPr>

</xml_diff>